<commit_message>
Presentation Saved as pdf
</commit_message>
<xml_diff>
--- a/Predicting Car Accident Severity.pptx
+++ b/Predicting Car Accident Severity.pptx
@@ -110,6 +110,11 @@
       </a:defRPr>
     </a:lvl9pPr>
   </p:defaultTextStyle>
+  <p:extLst>
+    <p:ext uri="{EFAFB233-063F-42B5-8137-9DF3F51BA10A}">
+      <p15:sldGuideLst xmlns:p15="http://schemas.microsoft.com/office/powerpoint/2012/main"/>
+    </p:ext>
+  </p:extLst>
 </p:presentation>
 </file>
 
@@ -278,7 +283,7 @@
           <a:p>
             <a:fld id="{72EA7947-E287-4738-8C82-07CE4F01EF03}" type="datetime2">
               <a:rPr lang="en-US" smtClean="0"/>
-              <a:t>Wednesday, September 23, 2020</a:t>
+              <a:t>Thursday, September 24, 2020</a:t>
             </a:fld>
             <a:endParaRPr lang="en-US" dirty="0"/>
           </a:p>
@@ -1314,7 +1319,7 @@
           <a:p>
             <a:fld id="{EE2EBD84-71F4-4271-8C46-0D47C0A9B12E}" type="datetime2">
               <a:rPr lang="en-US" smtClean="0"/>
-              <a:t>Wednesday, September 23, 2020</a:t>
+              <a:t>Thursday, September 24, 2020</a:t>
             </a:fld>
             <a:endParaRPr lang="en-US"/>
           </a:p>
@@ -1525,7 +1530,7 @@
           <a:p>
             <a:fld id="{ABAE0CE1-F450-4107-B2CB-17B18F8A3F4A}" type="datetime2">
               <a:rPr lang="en-US" smtClean="0"/>
-              <a:t>Wednesday, September 23, 2020</a:t>
+              <a:t>Thursday, September 24, 2020</a:t>
             </a:fld>
             <a:endParaRPr lang="en-US"/>
           </a:p>
@@ -2190,7 +2195,7 @@
           <a:p>
             <a:fld id="{6FE8C025-CD7A-4966-867E-81CF82B15267}" type="datetime2">
               <a:rPr lang="en-US" smtClean="0"/>
-              <a:t>Wednesday, September 23, 2020</a:t>
+              <a:t>Thursday, September 24, 2020</a:t>
             </a:fld>
             <a:endParaRPr lang="en-US"/>
           </a:p>
@@ -2810,7 +2815,7 @@
           <a:p>
             <a:fld id="{FE809929-0719-4517-94D6-FDF7F99E70F6}" type="datetime2">
               <a:rPr lang="en-US" smtClean="0"/>
-              <a:t>Wednesday, September 23, 2020</a:t>
+              <a:t>Thursday, September 24, 2020</a:t>
             </a:fld>
             <a:endParaRPr lang="en-US"/>
           </a:p>
@@ -3928,7 +3933,7 @@
           <a:p>
             <a:fld id="{20E95673-5512-4AAA-9AEB-E00C61EC65D5}" type="datetime2">
               <a:rPr lang="en-US" smtClean="0"/>
-              <a:t>Wednesday, September 23, 2020</a:t>
+              <a:t>Thursday, September 24, 2020</a:t>
             </a:fld>
             <a:endParaRPr lang="en-US"/>
           </a:p>
@@ -4475,7 +4480,7 @@
           <a:p>
             <a:fld id="{C13138FA-2E87-4873-8BBA-13E447C9A99A}" type="datetime2">
               <a:rPr lang="en-US" smtClean="0"/>
-              <a:t>Wednesday, September 23, 2020</a:t>
+              <a:t>Thursday, September 24, 2020</a:t>
             </a:fld>
             <a:endParaRPr lang="en-US"/>
           </a:p>
@@ -4636,7 +4641,7 @@
           <a:p>
             <a:fld id="{D75BB40A-97BD-4BFB-B639-0BFF95FDE8B7}" type="datetime2">
               <a:rPr lang="en-US" smtClean="0"/>
-              <a:t>Wednesday, September 23, 2020</a:t>
+              <a:t>Thursday, September 24, 2020</a:t>
             </a:fld>
             <a:endParaRPr lang="en-US"/>
           </a:p>
@@ -5671,7 +5676,7 @@
           <a:p>
             <a:fld id="{9EE9E0E3-ECF6-4CFE-8698-AEFEBCECC3C0}" type="datetime2">
               <a:rPr lang="en-US" smtClean="0"/>
-              <a:t>Wednesday, September 23, 2020</a:t>
+              <a:t>Thursday, September 24, 2020</a:t>
             </a:fld>
             <a:endParaRPr lang="en-US"/>
           </a:p>
@@ -6317,7 +6322,7 @@
           <a:p>
             <a:fld id="{251462FC-960E-4740-921F-B36862979F21}" type="datetime2">
               <a:rPr lang="en-US" smtClean="0"/>
-              <a:t>Wednesday, September 23, 2020</a:t>
+              <a:t>Thursday, September 24, 2020</a:t>
             </a:fld>
             <a:endParaRPr lang="en-US"/>
           </a:p>
@@ -7081,7 +7086,7 @@
           <a:p>
             <a:fld id="{E50BC9E2-CB44-4C05-9BB5-496C18A241E0}" type="datetime2">
               <a:rPr lang="en-US" smtClean="0"/>
-              <a:t>Wednesday, September 23, 2020</a:t>
+              <a:t>Thursday, September 24, 2020</a:t>
             </a:fld>
             <a:endParaRPr lang="en-US"/>
           </a:p>
@@ -7334,7 +7339,7 @@
           <a:p>
             <a:fld id="{246CB39B-5F4C-4A7E-9BE3-AAFD45576D16}" type="datetime2">
               <a:rPr lang="en-US" smtClean="0"/>
-              <a:t>Wednesday, September 23, 2020</a:t>
+              <a:t>Thursday, September 24, 2020</a:t>
             </a:fld>
             <a:endParaRPr lang="en-US" dirty="0"/>
           </a:p>
@@ -11202,7 +11207,7 @@
         </p:blipFill>
         <p:spPr>
           <a:xfrm>
-            <a:off x="6096000" y="3139106"/>
+            <a:off x="4811516" y="3110461"/>
             <a:ext cx="4536046" cy="3572137"/>
           </a:xfrm>
           <a:custGeom>

</xml_diff>